<commit_message>
CSS LEARNINGS CHAPTER 1 TO 4 DONE
</commit_message>
<xml_diff>
--- a/ROADMAP/Roadmap- CSS.pptx
+++ b/ROADMAP/Roadmap- CSS.pptx
@@ -106,6 +106,11 @@
       </a:defRPr>
     </a:lvl9pPr>
   </p:defaultTextStyle>
+  <p:extLst>
+    <p:ext uri="{EFAFB233-063F-42B5-8137-9DF3F51BA10A}">
+      <p15:sldGuideLst xmlns:p15="http://schemas.microsoft.com/office/powerpoint/2012/main"/>
+    </p:ext>
+  </p:extLst>
 </p:presentation>
 </file>
 
@@ -258,7 +263,7 @@
           <a:p>
             <a:fld id="{4B75F328-0CFE-44D7-AF58-50D6B4E72A82}" type="datetimeFigureOut">
               <a:rPr lang="en-IN" smtClean="0"/>
-              <a:t>15-10-2025</a:t>
+              <a:t>16-10-2025</a:t>
             </a:fld>
             <a:endParaRPr lang="en-IN"/>
           </a:p>
@@ -458,7 +463,7 @@
           <a:p>
             <a:fld id="{4B75F328-0CFE-44D7-AF58-50D6B4E72A82}" type="datetimeFigureOut">
               <a:rPr lang="en-IN" smtClean="0"/>
-              <a:t>15-10-2025</a:t>
+              <a:t>16-10-2025</a:t>
             </a:fld>
             <a:endParaRPr lang="en-IN"/>
           </a:p>
@@ -668,7 +673,7 @@
           <a:p>
             <a:fld id="{4B75F328-0CFE-44D7-AF58-50D6B4E72A82}" type="datetimeFigureOut">
               <a:rPr lang="en-IN" smtClean="0"/>
-              <a:t>15-10-2025</a:t>
+              <a:t>16-10-2025</a:t>
             </a:fld>
             <a:endParaRPr lang="en-IN"/>
           </a:p>
@@ -868,7 +873,7 @@
           <a:p>
             <a:fld id="{4B75F328-0CFE-44D7-AF58-50D6B4E72A82}" type="datetimeFigureOut">
               <a:rPr lang="en-IN" smtClean="0"/>
-              <a:t>15-10-2025</a:t>
+              <a:t>16-10-2025</a:t>
             </a:fld>
             <a:endParaRPr lang="en-IN"/>
           </a:p>
@@ -1144,7 +1149,7 @@
           <a:p>
             <a:fld id="{4B75F328-0CFE-44D7-AF58-50D6B4E72A82}" type="datetimeFigureOut">
               <a:rPr lang="en-IN" smtClean="0"/>
-              <a:t>15-10-2025</a:t>
+              <a:t>16-10-2025</a:t>
             </a:fld>
             <a:endParaRPr lang="en-IN"/>
           </a:p>
@@ -1412,7 +1417,7 @@
           <a:p>
             <a:fld id="{4B75F328-0CFE-44D7-AF58-50D6B4E72A82}" type="datetimeFigureOut">
               <a:rPr lang="en-IN" smtClean="0"/>
-              <a:t>15-10-2025</a:t>
+              <a:t>16-10-2025</a:t>
             </a:fld>
             <a:endParaRPr lang="en-IN"/>
           </a:p>
@@ -1827,7 +1832,7 @@
           <a:p>
             <a:fld id="{4B75F328-0CFE-44D7-AF58-50D6B4E72A82}" type="datetimeFigureOut">
               <a:rPr lang="en-IN" smtClean="0"/>
-              <a:t>15-10-2025</a:t>
+              <a:t>16-10-2025</a:t>
             </a:fld>
             <a:endParaRPr lang="en-IN"/>
           </a:p>
@@ -1969,7 +1974,7 @@
           <a:p>
             <a:fld id="{4B75F328-0CFE-44D7-AF58-50D6B4E72A82}" type="datetimeFigureOut">
               <a:rPr lang="en-IN" smtClean="0"/>
-              <a:t>15-10-2025</a:t>
+              <a:t>16-10-2025</a:t>
             </a:fld>
             <a:endParaRPr lang="en-IN"/>
           </a:p>
@@ -2082,7 +2087,7 @@
           <a:p>
             <a:fld id="{4B75F328-0CFE-44D7-AF58-50D6B4E72A82}" type="datetimeFigureOut">
               <a:rPr lang="en-IN" smtClean="0"/>
-              <a:t>15-10-2025</a:t>
+              <a:t>16-10-2025</a:t>
             </a:fld>
             <a:endParaRPr lang="en-IN"/>
           </a:p>
@@ -2395,7 +2400,7 @@
           <a:p>
             <a:fld id="{4B75F328-0CFE-44D7-AF58-50D6B4E72A82}" type="datetimeFigureOut">
               <a:rPr lang="en-IN" smtClean="0"/>
-              <a:t>15-10-2025</a:t>
+              <a:t>16-10-2025</a:t>
             </a:fld>
             <a:endParaRPr lang="en-IN"/>
           </a:p>
@@ -2684,7 +2689,7 @@
           <a:p>
             <a:fld id="{4B75F328-0CFE-44D7-AF58-50D6B4E72A82}" type="datetimeFigureOut">
               <a:rPr lang="en-IN" smtClean="0"/>
-              <a:t>15-10-2025</a:t>
+              <a:t>16-10-2025</a:t>
             </a:fld>
             <a:endParaRPr lang="en-IN"/>
           </a:p>
@@ -2927,7 +2932,7 @@
           <a:p>
             <a:fld id="{4B75F328-0CFE-44D7-AF58-50D6B4E72A82}" type="datetimeFigureOut">
               <a:rPr lang="en-IN" smtClean="0"/>
-              <a:t>15-10-2025</a:t>
+              <a:t>16-10-2025</a:t>
             </a:fld>
             <a:endParaRPr lang="en-IN"/>
           </a:p>
@@ -3964,7 +3969,7 @@
             <p:ph idx="1"/>
             <p:extLst>
               <p:ext uri="{D42A27DB-BD31-4B8C-83A1-F6EECF244321}">
-                <p14:modId xmlns:p14="http://schemas.microsoft.com/office/powerpoint/2010/main" val="3037225355"/>
+                <p14:modId xmlns:p14="http://schemas.microsoft.com/office/powerpoint/2010/main" val="2712930269"/>
               </p:ext>
             </p:extLst>
           </p:nvPr>
@@ -4182,12 +4187,18 @@
                     <a:p>
                       <a:pPr algn="ctr" fontAlgn="ctr"/>
                       <a:r>
-                        <a:rPr lang="en-IN" sz="800" u="none" strike="noStrike">
+                        <a:rPr lang="en-IN" sz="1400" u="none" strike="noStrike" dirty="0">
+                          <a:effectLst/>
+                        </a:rPr>
+                        <a:t>DONE</a:t>
+                      </a:r>
+                      <a:r>
+                        <a:rPr lang="en-IN" sz="800" u="none" strike="noStrike" dirty="0">
                           <a:effectLst/>
                         </a:rPr>
                         <a:t> </a:t>
                       </a:r>
-                      <a:endParaRPr lang="en-IN" sz="800" b="0" i="0" u="none" strike="noStrike">
+                      <a:endParaRPr lang="en-IN" sz="800" b="0" i="0" u="none" strike="noStrike" dirty="0">
                         <a:solidFill>
                           <a:srgbClr val="000000"/>
                         </a:solidFill>

</xml_diff>

<commit_message>
styling links files and roadmap updated
</commit_message>
<xml_diff>
--- a/ROADMAP/Roadmap- CSS.pptx
+++ b/ROADMAP/Roadmap- CSS.pptx
@@ -263,7 +263,7 @@
           <a:p>
             <a:fld id="{4B75F328-0CFE-44D7-AF58-50D6B4E72A82}" type="datetimeFigureOut">
               <a:rPr lang="en-IN" smtClean="0"/>
-              <a:t>16-10-2025</a:t>
+              <a:t>19-10-2025</a:t>
             </a:fld>
             <a:endParaRPr lang="en-IN"/>
           </a:p>
@@ -463,7 +463,7 @@
           <a:p>
             <a:fld id="{4B75F328-0CFE-44D7-AF58-50D6B4E72A82}" type="datetimeFigureOut">
               <a:rPr lang="en-IN" smtClean="0"/>
-              <a:t>16-10-2025</a:t>
+              <a:t>19-10-2025</a:t>
             </a:fld>
             <a:endParaRPr lang="en-IN"/>
           </a:p>
@@ -673,7 +673,7 @@
           <a:p>
             <a:fld id="{4B75F328-0CFE-44D7-AF58-50D6B4E72A82}" type="datetimeFigureOut">
               <a:rPr lang="en-IN" smtClean="0"/>
-              <a:t>16-10-2025</a:t>
+              <a:t>19-10-2025</a:t>
             </a:fld>
             <a:endParaRPr lang="en-IN"/>
           </a:p>
@@ -873,7 +873,7 @@
           <a:p>
             <a:fld id="{4B75F328-0CFE-44D7-AF58-50D6B4E72A82}" type="datetimeFigureOut">
               <a:rPr lang="en-IN" smtClean="0"/>
-              <a:t>16-10-2025</a:t>
+              <a:t>19-10-2025</a:t>
             </a:fld>
             <a:endParaRPr lang="en-IN"/>
           </a:p>
@@ -1149,7 +1149,7 @@
           <a:p>
             <a:fld id="{4B75F328-0CFE-44D7-AF58-50D6B4E72A82}" type="datetimeFigureOut">
               <a:rPr lang="en-IN" smtClean="0"/>
-              <a:t>16-10-2025</a:t>
+              <a:t>19-10-2025</a:t>
             </a:fld>
             <a:endParaRPr lang="en-IN"/>
           </a:p>
@@ -1417,7 +1417,7 @@
           <a:p>
             <a:fld id="{4B75F328-0CFE-44D7-AF58-50D6B4E72A82}" type="datetimeFigureOut">
               <a:rPr lang="en-IN" smtClean="0"/>
-              <a:t>16-10-2025</a:t>
+              <a:t>19-10-2025</a:t>
             </a:fld>
             <a:endParaRPr lang="en-IN"/>
           </a:p>
@@ -1832,7 +1832,7 @@
           <a:p>
             <a:fld id="{4B75F328-0CFE-44D7-AF58-50D6B4E72A82}" type="datetimeFigureOut">
               <a:rPr lang="en-IN" smtClean="0"/>
-              <a:t>16-10-2025</a:t>
+              <a:t>19-10-2025</a:t>
             </a:fld>
             <a:endParaRPr lang="en-IN"/>
           </a:p>
@@ -1974,7 +1974,7 @@
           <a:p>
             <a:fld id="{4B75F328-0CFE-44D7-AF58-50D6B4E72A82}" type="datetimeFigureOut">
               <a:rPr lang="en-IN" smtClean="0"/>
-              <a:t>16-10-2025</a:t>
+              <a:t>19-10-2025</a:t>
             </a:fld>
             <a:endParaRPr lang="en-IN"/>
           </a:p>
@@ -2087,7 +2087,7 @@
           <a:p>
             <a:fld id="{4B75F328-0CFE-44D7-AF58-50D6B4E72A82}" type="datetimeFigureOut">
               <a:rPr lang="en-IN" smtClean="0"/>
-              <a:t>16-10-2025</a:t>
+              <a:t>19-10-2025</a:t>
             </a:fld>
             <a:endParaRPr lang="en-IN"/>
           </a:p>
@@ -2400,7 +2400,7 @@
           <a:p>
             <a:fld id="{4B75F328-0CFE-44D7-AF58-50D6B4E72A82}" type="datetimeFigureOut">
               <a:rPr lang="en-IN" smtClean="0"/>
-              <a:t>16-10-2025</a:t>
+              <a:t>19-10-2025</a:t>
             </a:fld>
             <a:endParaRPr lang="en-IN"/>
           </a:p>
@@ -2689,7 +2689,7 @@
           <a:p>
             <a:fld id="{4B75F328-0CFE-44D7-AF58-50D6B4E72A82}" type="datetimeFigureOut">
               <a:rPr lang="en-IN" smtClean="0"/>
-              <a:t>16-10-2025</a:t>
+              <a:t>19-10-2025</a:t>
             </a:fld>
             <a:endParaRPr lang="en-IN"/>
           </a:p>
@@ -2932,7 +2932,7 @@
           <a:p>
             <a:fld id="{4B75F328-0CFE-44D7-AF58-50D6B4E72A82}" type="datetimeFigureOut">
               <a:rPr lang="en-IN" smtClean="0"/>
-              <a:t>16-10-2025</a:t>
+              <a:t>19-10-2025</a:t>
             </a:fld>
             <a:endParaRPr lang="en-IN"/>
           </a:p>
@@ -3969,7 +3969,7 @@
             <p:ph idx="1"/>
             <p:extLst>
               <p:ext uri="{D42A27DB-BD31-4B8C-83A1-F6EECF244321}">
-                <p14:modId xmlns:p14="http://schemas.microsoft.com/office/powerpoint/2010/main" val="2712930269"/>
+                <p14:modId xmlns:p14="http://schemas.microsoft.com/office/powerpoint/2010/main" val="2761388952"/>
               </p:ext>
             </p:extLst>
           </p:nvPr>
@@ -4291,12 +4291,18 @@
                     <a:p>
                       <a:pPr algn="ctr" fontAlgn="ctr"/>
                       <a:r>
-                        <a:rPr lang="en-IN" sz="800" u="none" strike="noStrike">
+                        <a:rPr lang="en-IN" sz="800" u="none" strike="noStrike" dirty="0">
                           <a:effectLst/>
                         </a:rPr>
                         <a:t> </a:t>
                       </a:r>
-                      <a:endParaRPr lang="en-IN" sz="800" b="0" i="0" u="none" strike="noStrike">
+                      <a:r>
+                        <a:rPr lang="en-IN" sz="1400" u="none" strike="noStrike" dirty="0">
+                          <a:effectLst/>
+                        </a:rPr>
+                        <a:t>DONE</a:t>
+                      </a:r>
+                      <a:endParaRPr lang="en-IN" sz="1400" b="0" i="0" u="none" strike="noStrike" dirty="0">
                         <a:solidFill>
                           <a:srgbClr val="000000"/>
                         </a:solidFill>

</xml_diff>

<commit_message>
chapter 14 and 15 flexbox and gridlayout done
</commit_message>
<xml_diff>
--- a/ROADMAP/Roadmap- CSS.pptx
+++ b/ROADMAP/Roadmap- CSS.pptx
@@ -263,7 +263,7 @@
           <a:p>
             <a:fld id="{4B75F328-0CFE-44D7-AF58-50D6B4E72A82}" type="datetimeFigureOut">
               <a:rPr lang="en-IN" smtClean="0"/>
-              <a:t>31-10-2025</a:t>
+              <a:t>08-11-2025</a:t>
             </a:fld>
             <a:endParaRPr lang="en-IN"/>
           </a:p>
@@ -463,7 +463,7 @@
           <a:p>
             <a:fld id="{4B75F328-0CFE-44D7-AF58-50D6B4E72A82}" type="datetimeFigureOut">
               <a:rPr lang="en-IN" smtClean="0"/>
-              <a:t>31-10-2025</a:t>
+              <a:t>08-11-2025</a:t>
             </a:fld>
             <a:endParaRPr lang="en-IN"/>
           </a:p>
@@ -673,7 +673,7 @@
           <a:p>
             <a:fld id="{4B75F328-0CFE-44D7-AF58-50D6B4E72A82}" type="datetimeFigureOut">
               <a:rPr lang="en-IN" smtClean="0"/>
-              <a:t>31-10-2025</a:t>
+              <a:t>08-11-2025</a:t>
             </a:fld>
             <a:endParaRPr lang="en-IN"/>
           </a:p>
@@ -873,7 +873,7 @@
           <a:p>
             <a:fld id="{4B75F328-0CFE-44D7-AF58-50D6B4E72A82}" type="datetimeFigureOut">
               <a:rPr lang="en-IN" smtClean="0"/>
-              <a:t>31-10-2025</a:t>
+              <a:t>08-11-2025</a:t>
             </a:fld>
             <a:endParaRPr lang="en-IN"/>
           </a:p>
@@ -1149,7 +1149,7 @@
           <a:p>
             <a:fld id="{4B75F328-0CFE-44D7-AF58-50D6B4E72A82}" type="datetimeFigureOut">
               <a:rPr lang="en-IN" smtClean="0"/>
-              <a:t>31-10-2025</a:t>
+              <a:t>08-11-2025</a:t>
             </a:fld>
             <a:endParaRPr lang="en-IN"/>
           </a:p>
@@ -1417,7 +1417,7 @@
           <a:p>
             <a:fld id="{4B75F328-0CFE-44D7-AF58-50D6B4E72A82}" type="datetimeFigureOut">
               <a:rPr lang="en-IN" smtClean="0"/>
-              <a:t>31-10-2025</a:t>
+              <a:t>08-11-2025</a:t>
             </a:fld>
             <a:endParaRPr lang="en-IN"/>
           </a:p>
@@ -1832,7 +1832,7 @@
           <a:p>
             <a:fld id="{4B75F328-0CFE-44D7-AF58-50D6B4E72A82}" type="datetimeFigureOut">
               <a:rPr lang="en-IN" smtClean="0"/>
-              <a:t>31-10-2025</a:t>
+              <a:t>08-11-2025</a:t>
             </a:fld>
             <a:endParaRPr lang="en-IN"/>
           </a:p>
@@ -1974,7 +1974,7 @@
           <a:p>
             <a:fld id="{4B75F328-0CFE-44D7-AF58-50D6B4E72A82}" type="datetimeFigureOut">
               <a:rPr lang="en-IN" smtClean="0"/>
-              <a:t>31-10-2025</a:t>
+              <a:t>08-11-2025</a:t>
             </a:fld>
             <a:endParaRPr lang="en-IN"/>
           </a:p>
@@ -2087,7 +2087,7 @@
           <a:p>
             <a:fld id="{4B75F328-0CFE-44D7-AF58-50D6B4E72A82}" type="datetimeFigureOut">
               <a:rPr lang="en-IN" smtClean="0"/>
-              <a:t>31-10-2025</a:t>
+              <a:t>08-11-2025</a:t>
             </a:fld>
             <a:endParaRPr lang="en-IN"/>
           </a:p>
@@ -2400,7 +2400,7 @@
           <a:p>
             <a:fld id="{4B75F328-0CFE-44D7-AF58-50D6B4E72A82}" type="datetimeFigureOut">
               <a:rPr lang="en-IN" smtClean="0"/>
-              <a:t>31-10-2025</a:t>
+              <a:t>08-11-2025</a:t>
             </a:fld>
             <a:endParaRPr lang="en-IN"/>
           </a:p>
@@ -2689,7 +2689,7 @@
           <a:p>
             <a:fld id="{4B75F328-0CFE-44D7-AF58-50D6B4E72A82}" type="datetimeFigureOut">
               <a:rPr lang="en-IN" smtClean="0"/>
-              <a:t>31-10-2025</a:t>
+              <a:t>08-11-2025</a:t>
             </a:fld>
             <a:endParaRPr lang="en-IN"/>
           </a:p>
@@ -2932,7 +2932,7 @@
           <a:p>
             <a:fld id="{4B75F328-0CFE-44D7-AF58-50D6B4E72A82}" type="datetimeFigureOut">
               <a:rPr lang="en-IN" smtClean="0"/>
-              <a:t>31-10-2025</a:t>
+              <a:t>08-11-2025</a:t>
             </a:fld>
             <a:endParaRPr lang="en-IN"/>
           </a:p>
@@ -3969,7 +3969,7 @@
             <p:ph idx="1"/>
             <p:extLst>
               <p:ext uri="{D42A27DB-BD31-4B8C-83A1-F6EECF244321}">
-                <p14:modId xmlns:p14="http://schemas.microsoft.com/office/powerpoint/2010/main" val="879292425"/>
+                <p14:modId xmlns:p14="http://schemas.microsoft.com/office/powerpoint/2010/main" val="2169506145"/>
               </p:ext>
             </p:extLst>
           </p:nvPr>
@@ -4510,6 +4510,12 @@
                     <a:p>
                       <a:pPr algn="ctr" fontAlgn="ctr"/>
                       <a:r>
+                        <a:rPr lang="en-IN" sz="1400" u="none" strike="noStrike" dirty="0">
+                          <a:effectLst/>
+                        </a:rPr>
+                        <a:t>DONE</a:t>
+                      </a:r>
+                      <a:r>
                         <a:rPr lang="en-IN" sz="800" u="none" strike="noStrike" dirty="0">
                           <a:effectLst/>
                         </a:rPr>
@@ -4540,23 +4546,23 @@
                     <a:p>
                       <a:pPr algn="ctr" fontAlgn="ctr"/>
                       <a:r>
-                        <a:rPr lang="en-IN" sz="1400" u="none" strike="noStrike">
+                        <a:rPr lang="en-IN" sz="1400" u="none" strike="noStrike" dirty="0">
                           <a:effectLst/>
                         </a:rPr>
                         <a:t>Chapter 15: Grid Layout</a:t>
                       </a:r>
                       <a:br>
-                        <a:rPr lang="en-IN" sz="1400" u="none" strike="noStrike">
+                        <a:rPr lang="en-IN" sz="1400" u="none" strike="noStrike" dirty="0">
                           <a:effectLst/>
                         </a:rPr>
                       </a:br>
                       <a:r>
-                        <a:rPr lang="en-IN" sz="1400" u="none" strike="noStrike">
+                        <a:rPr lang="en-IN" sz="1400" u="none" strike="noStrike" dirty="0">
                           <a:effectLst/>
                         </a:rPr>
                         <a:t>Chapter 16: Images </a:t>
                       </a:r>
-                      <a:endParaRPr lang="en-IN" sz="1400" b="0" i="0" u="none" strike="noStrike">
+                      <a:endParaRPr lang="en-IN" sz="1400" b="0" i="0" u="none" strike="noStrike" dirty="0">
                         <a:solidFill>
                           <a:srgbClr val="000000"/>
                         </a:solidFill>

</xml_diff>

<commit_message>
chapter 17 images done
</commit_message>
<xml_diff>
--- a/ROADMAP/Roadmap- CSS.pptx
+++ b/ROADMAP/Roadmap- CSS.pptx
@@ -263,7 +263,7 @@
           <a:p>
             <a:fld id="{4B75F328-0CFE-44D7-AF58-50D6B4E72A82}" type="datetimeFigureOut">
               <a:rPr lang="en-IN" smtClean="0"/>
-              <a:t>08-11-2025</a:t>
+              <a:t>09-11-2025</a:t>
             </a:fld>
             <a:endParaRPr lang="en-IN"/>
           </a:p>
@@ -463,7 +463,7 @@
           <a:p>
             <a:fld id="{4B75F328-0CFE-44D7-AF58-50D6B4E72A82}" type="datetimeFigureOut">
               <a:rPr lang="en-IN" smtClean="0"/>
-              <a:t>08-11-2025</a:t>
+              <a:t>09-11-2025</a:t>
             </a:fld>
             <a:endParaRPr lang="en-IN"/>
           </a:p>
@@ -673,7 +673,7 @@
           <a:p>
             <a:fld id="{4B75F328-0CFE-44D7-AF58-50D6B4E72A82}" type="datetimeFigureOut">
               <a:rPr lang="en-IN" smtClean="0"/>
-              <a:t>08-11-2025</a:t>
+              <a:t>09-11-2025</a:t>
             </a:fld>
             <a:endParaRPr lang="en-IN"/>
           </a:p>
@@ -873,7 +873,7 @@
           <a:p>
             <a:fld id="{4B75F328-0CFE-44D7-AF58-50D6B4E72A82}" type="datetimeFigureOut">
               <a:rPr lang="en-IN" smtClean="0"/>
-              <a:t>08-11-2025</a:t>
+              <a:t>09-11-2025</a:t>
             </a:fld>
             <a:endParaRPr lang="en-IN"/>
           </a:p>
@@ -1149,7 +1149,7 @@
           <a:p>
             <a:fld id="{4B75F328-0CFE-44D7-AF58-50D6B4E72A82}" type="datetimeFigureOut">
               <a:rPr lang="en-IN" smtClean="0"/>
-              <a:t>08-11-2025</a:t>
+              <a:t>09-11-2025</a:t>
             </a:fld>
             <a:endParaRPr lang="en-IN"/>
           </a:p>
@@ -1417,7 +1417,7 @@
           <a:p>
             <a:fld id="{4B75F328-0CFE-44D7-AF58-50D6B4E72A82}" type="datetimeFigureOut">
               <a:rPr lang="en-IN" smtClean="0"/>
-              <a:t>08-11-2025</a:t>
+              <a:t>09-11-2025</a:t>
             </a:fld>
             <a:endParaRPr lang="en-IN"/>
           </a:p>
@@ -1832,7 +1832,7 @@
           <a:p>
             <a:fld id="{4B75F328-0CFE-44D7-AF58-50D6B4E72A82}" type="datetimeFigureOut">
               <a:rPr lang="en-IN" smtClean="0"/>
-              <a:t>08-11-2025</a:t>
+              <a:t>09-11-2025</a:t>
             </a:fld>
             <a:endParaRPr lang="en-IN"/>
           </a:p>
@@ -1974,7 +1974,7 @@
           <a:p>
             <a:fld id="{4B75F328-0CFE-44D7-AF58-50D6B4E72A82}" type="datetimeFigureOut">
               <a:rPr lang="en-IN" smtClean="0"/>
-              <a:t>08-11-2025</a:t>
+              <a:t>09-11-2025</a:t>
             </a:fld>
             <a:endParaRPr lang="en-IN"/>
           </a:p>
@@ -2087,7 +2087,7 @@
           <a:p>
             <a:fld id="{4B75F328-0CFE-44D7-AF58-50D6B4E72A82}" type="datetimeFigureOut">
               <a:rPr lang="en-IN" smtClean="0"/>
-              <a:t>08-11-2025</a:t>
+              <a:t>09-11-2025</a:t>
             </a:fld>
             <a:endParaRPr lang="en-IN"/>
           </a:p>
@@ -2400,7 +2400,7 @@
           <a:p>
             <a:fld id="{4B75F328-0CFE-44D7-AF58-50D6B4E72A82}" type="datetimeFigureOut">
               <a:rPr lang="en-IN" smtClean="0"/>
-              <a:t>08-11-2025</a:t>
+              <a:t>09-11-2025</a:t>
             </a:fld>
             <a:endParaRPr lang="en-IN"/>
           </a:p>
@@ -2689,7 +2689,7 @@
           <a:p>
             <a:fld id="{4B75F328-0CFE-44D7-AF58-50D6B4E72A82}" type="datetimeFigureOut">
               <a:rPr lang="en-IN" smtClean="0"/>
-              <a:t>08-11-2025</a:t>
+              <a:t>09-11-2025</a:t>
             </a:fld>
             <a:endParaRPr lang="en-IN"/>
           </a:p>
@@ -2932,7 +2932,7 @@
           <a:p>
             <a:fld id="{4B75F328-0CFE-44D7-AF58-50D6B4E72A82}" type="datetimeFigureOut">
               <a:rPr lang="en-IN" smtClean="0"/>
-              <a:t>08-11-2025</a:t>
+              <a:t>09-11-2025</a:t>
             </a:fld>
             <a:endParaRPr lang="en-IN"/>
           </a:p>
@@ -3969,7 +3969,7 @@
             <p:ph idx="1"/>
             <p:extLst>
               <p:ext uri="{D42A27DB-BD31-4B8C-83A1-F6EECF244321}">
-                <p14:modId xmlns:p14="http://schemas.microsoft.com/office/powerpoint/2010/main" val="2169506145"/>
+                <p14:modId xmlns:p14="http://schemas.microsoft.com/office/powerpoint/2010/main" val="3961280310"/>
               </p:ext>
             </p:extLst>
           </p:nvPr>
@@ -4603,12 +4603,18 @@
                     <a:p>
                       <a:pPr algn="ctr" fontAlgn="ctr"/>
                       <a:r>
-                        <a:rPr lang="en-IN" sz="800" u="none" strike="noStrike">
+                        <a:rPr lang="en-IN" sz="800" u="none" strike="noStrike" dirty="0">
                           <a:effectLst/>
                         </a:rPr>
                         <a:t> </a:t>
                       </a:r>
-                      <a:endParaRPr lang="en-IN" sz="800" b="0" i="0" u="none" strike="noStrike">
+                      <a:r>
+                        <a:rPr lang="en-IN" sz="1400" u="none" strike="noStrike" dirty="0">
+                          <a:effectLst/>
+                        </a:rPr>
+                        <a:t>DONE</a:t>
+                      </a:r>
+                      <a:endParaRPr lang="en-IN" sz="1400" b="0" i="0" u="none" strike="noStrike" dirty="0">
                         <a:solidFill>
                           <a:srgbClr val="000000"/>
                         </a:solidFill>
@@ -4633,23 +4639,59 @@
                     <a:p>
                       <a:pPr algn="ctr" fontAlgn="ctr"/>
                       <a:r>
-                        <a:rPr lang="fr-FR" sz="1400" u="none" strike="noStrike">
-                          <a:effectLst/>
-                        </a:rPr>
-                        <a:t>Chapter 17: Media Queries </a:t>
+                        <a:rPr lang="fr-FR" sz="1400" u="none" strike="noStrike" dirty="0" err="1">
+                          <a:effectLst/>
+                        </a:rPr>
+                        <a:t>Chapter</a:t>
+                      </a:r>
+                      <a:r>
+                        <a:rPr lang="fr-FR" sz="1400" u="none" strike="noStrike" dirty="0">
+                          <a:effectLst/>
+                        </a:rPr>
+                        <a:t> 17: Media </a:t>
+                      </a:r>
+                      <a:r>
+                        <a:rPr lang="fr-FR" sz="1400" u="none" strike="noStrike" dirty="0" err="1">
+                          <a:effectLst/>
+                        </a:rPr>
+                        <a:t>Queries</a:t>
+                      </a:r>
+                      <a:r>
+                        <a:rPr lang="fr-FR" sz="1400" u="none" strike="noStrike" dirty="0">
+                          <a:effectLst/>
+                        </a:rPr>
+                        <a:t> </a:t>
                       </a:r>
                       <a:br>
-                        <a:rPr lang="fr-FR" sz="1400" u="none" strike="noStrike">
+                        <a:rPr lang="fr-FR" sz="1400" u="none" strike="noStrike" dirty="0">
                           <a:effectLst/>
                         </a:rPr>
                       </a:br>
                       <a:r>
-                        <a:rPr lang="fr-FR" sz="1400" u="none" strike="noStrike">
-                          <a:effectLst/>
-                        </a:rPr>
-                        <a:t>Chapter 18: Card Project </a:t>
-                      </a:r>
-                      <a:endParaRPr lang="fr-FR" sz="1400" b="0" i="0" u="none" strike="noStrike">
+                        <a:rPr lang="fr-FR" sz="1400" u="none" strike="noStrike" dirty="0" err="1">
+                          <a:effectLst/>
+                        </a:rPr>
+                        <a:t>Chapter</a:t>
+                      </a:r>
+                      <a:r>
+                        <a:rPr lang="fr-FR" sz="1400" u="none" strike="noStrike" dirty="0">
+                          <a:effectLst/>
+                        </a:rPr>
+                        <a:t> 18: </a:t>
+                      </a:r>
+                      <a:r>
+                        <a:rPr lang="fr-FR" sz="1400" u="none" strike="noStrike" dirty="0" err="1">
+                          <a:effectLst/>
+                        </a:rPr>
+                        <a:t>Card</a:t>
+                      </a:r>
+                      <a:r>
+                        <a:rPr lang="fr-FR" sz="1400" u="none" strike="noStrike" dirty="0">
+                          <a:effectLst/>
+                        </a:rPr>
+                        <a:t> Project </a:t>
+                      </a:r>
+                      <a:endParaRPr lang="fr-FR" sz="1400" b="0" i="0" u="none" strike="noStrike" dirty="0">
                         <a:solidFill>
                           <a:srgbClr val="000000"/>
                         </a:solidFill>

</xml_diff>

<commit_message>
chapter 18 card project done
</commit_message>
<xml_diff>
--- a/ROADMAP/Roadmap- CSS.pptx
+++ b/ROADMAP/Roadmap- CSS.pptx
@@ -263,7 +263,7 @@
           <a:p>
             <a:fld id="{4B75F328-0CFE-44D7-AF58-50D6B4E72A82}" type="datetimeFigureOut">
               <a:rPr lang="en-IN" smtClean="0"/>
-              <a:t>09-11-2025</a:t>
+              <a:t>11-11-2025</a:t>
             </a:fld>
             <a:endParaRPr lang="en-IN"/>
           </a:p>
@@ -463,7 +463,7 @@
           <a:p>
             <a:fld id="{4B75F328-0CFE-44D7-AF58-50D6B4E72A82}" type="datetimeFigureOut">
               <a:rPr lang="en-IN" smtClean="0"/>
-              <a:t>09-11-2025</a:t>
+              <a:t>11-11-2025</a:t>
             </a:fld>
             <a:endParaRPr lang="en-IN"/>
           </a:p>
@@ -673,7 +673,7 @@
           <a:p>
             <a:fld id="{4B75F328-0CFE-44D7-AF58-50D6B4E72A82}" type="datetimeFigureOut">
               <a:rPr lang="en-IN" smtClean="0"/>
-              <a:t>09-11-2025</a:t>
+              <a:t>11-11-2025</a:t>
             </a:fld>
             <a:endParaRPr lang="en-IN"/>
           </a:p>
@@ -873,7 +873,7 @@
           <a:p>
             <a:fld id="{4B75F328-0CFE-44D7-AF58-50D6B4E72A82}" type="datetimeFigureOut">
               <a:rPr lang="en-IN" smtClean="0"/>
-              <a:t>09-11-2025</a:t>
+              <a:t>11-11-2025</a:t>
             </a:fld>
             <a:endParaRPr lang="en-IN"/>
           </a:p>
@@ -1149,7 +1149,7 @@
           <a:p>
             <a:fld id="{4B75F328-0CFE-44D7-AF58-50D6B4E72A82}" type="datetimeFigureOut">
               <a:rPr lang="en-IN" smtClean="0"/>
-              <a:t>09-11-2025</a:t>
+              <a:t>11-11-2025</a:t>
             </a:fld>
             <a:endParaRPr lang="en-IN"/>
           </a:p>
@@ -1417,7 +1417,7 @@
           <a:p>
             <a:fld id="{4B75F328-0CFE-44D7-AF58-50D6B4E72A82}" type="datetimeFigureOut">
               <a:rPr lang="en-IN" smtClean="0"/>
-              <a:t>09-11-2025</a:t>
+              <a:t>11-11-2025</a:t>
             </a:fld>
             <a:endParaRPr lang="en-IN"/>
           </a:p>
@@ -1832,7 +1832,7 @@
           <a:p>
             <a:fld id="{4B75F328-0CFE-44D7-AF58-50D6B4E72A82}" type="datetimeFigureOut">
               <a:rPr lang="en-IN" smtClean="0"/>
-              <a:t>09-11-2025</a:t>
+              <a:t>11-11-2025</a:t>
             </a:fld>
             <a:endParaRPr lang="en-IN"/>
           </a:p>
@@ -1974,7 +1974,7 @@
           <a:p>
             <a:fld id="{4B75F328-0CFE-44D7-AF58-50D6B4E72A82}" type="datetimeFigureOut">
               <a:rPr lang="en-IN" smtClean="0"/>
-              <a:t>09-11-2025</a:t>
+              <a:t>11-11-2025</a:t>
             </a:fld>
             <a:endParaRPr lang="en-IN"/>
           </a:p>
@@ -2087,7 +2087,7 @@
           <a:p>
             <a:fld id="{4B75F328-0CFE-44D7-AF58-50D6B4E72A82}" type="datetimeFigureOut">
               <a:rPr lang="en-IN" smtClean="0"/>
-              <a:t>09-11-2025</a:t>
+              <a:t>11-11-2025</a:t>
             </a:fld>
             <a:endParaRPr lang="en-IN"/>
           </a:p>
@@ -2400,7 +2400,7 @@
           <a:p>
             <a:fld id="{4B75F328-0CFE-44D7-AF58-50D6B4E72A82}" type="datetimeFigureOut">
               <a:rPr lang="en-IN" smtClean="0"/>
-              <a:t>09-11-2025</a:t>
+              <a:t>11-11-2025</a:t>
             </a:fld>
             <a:endParaRPr lang="en-IN"/>
           </a:p>
@@ -2689,7 +2689,7 @@
           <a:p>
             <a:fld id="{4B75F328-0CFE-44D7-AF58-50D6B4E72A82}" type="datetimeFigureOut">
               <a:rPr lang="en-IN" smtClean="0"/>
-              <a:t>09-11-2025</a:t>
+              <a:t>11-11-2025</a:t>
             </a:fld>
             <a:endParaRPr lang="en-IN"/>
           </a:p>
@@ -2932,7 +2932,7 @@
           <a:p>
             <a:fld id="{4B75F328-0CFE-44D7-AF58-50D6B4E72A82}" type="datetimeFigureOut">
               <a:rPr lang="en-IN" smtClean="0"/>
-              <a:t>09-11-2025</a:t>
+              <a:t>11-11-2025</a:t>
             </a:fld>
             <a:endParaRPr lang="en-IN"/>
           </a:p>
@@ -3969,7 +3969,7 @@
             <p:ph idx="1"/>
             <p:extLst>
               <p:ext uri="{D42A27DB-BD31-4B8C-83A1-F6EECF244321}">
-                <p14:modId xmlns:p14="http://schemas.microsoft.com/office/powerpoint/2010/main" val="3961280310"/>
+                <p14:modId xmlns:p14="http://schemas.microsoft.com/office/powerpoint/2010/main" val="2807782918"/>
               </p:ext>
             </p:extLst>
           </p:nvPr>
@@ -4732,12 +4732,18 @@
                     <a:p>
                       <a:pPr algn="ctr" fontAlgn="ctr"/>
                       <a:r>
-                        <a:rPr lang="en-IN" sz="800" u="none" strike="noStrike">
+                        <a:rPr lang="en-IN" sz="1400" u="none" strike="noStrike" dirty="0">
+                          <a:effectLst/>
+                        </a:rPr>
+                        <a:t>DONE</a:t>
+                      </a:r>
+                      <a:r>
+                        <a:rPr lang="en-IN" sz="800" u="none" strike="noStrike" dirty="0">
                           <a:effectLst/>
                         </a:rPr>
                         <a:t> </a:t>
                       </a:r>
-                      <a:endParaRPr lang="en-IN" sz="800" b="0" i="0" u="none" strike="noStrike">
+                      <a:endParaRPr lang="en-IN" sz="800" b="0" i="0" u="none" strike="noStrike" dirty="0">
                         <a:solidFill>
                           <a:srgbClr val="000000"/>
                         </a:solidFill>
@@ -4819,12 +4825,12 @@
                     <a:p>
                       <a:pPr algn="ctr" fontAlgn="ctr"/>
                       <a:r>
-                        <a:rPr lang="en-IN" sz="800" u="none" strike="noStrike">
+                        <a:rPr lang="en-IN" sz="800" u="none" strike="noStrike" dirty="0">
                           <a:effectLst/>
                         </a:rPr>
                         <a:t> </a:t>
                       </a:r>
-                      <a:endParaRPr lang="en-IN" sz="800" b="0" i="0" u="none" strike="noStrike">
+                      <a:endParaRPr lang="en-IN" sz="800" b="0" i="0" u="none" strike="noStrike" dirty="0">
                         <a:solidFill>
                           <a:srgbClr val="000000"/>
                         </a:solidFill>

</xml_diff>

<commit_message>
chapter 19 ans 20 done
</commit_message>
<xml_diff>
--- a/ROADMAP/Roadmap- CSS.pptx
+++ b/ROADMAP/Roadmap- CSS.pptx
@@ -263,7 +263,7 @@
           <a:p>
             <a:fld id="{4B75F328-0CFE-44D7-AF58-50D6B4E72A82}" type="datetimeFigureOut">
               <a:rPr lang="en-IN" smtClean="0"/>
-              <a:t>11-11-2025</a:t>
+              <a:t>12-11-2025</a:t>
             </a:fld>
             <a:endParaRPr lang="en-IN"/>
           </a:p>
@@ -463,7 +463,7 @@
           <a:p>
             <a:fld id="{4B75F328-0CFE-44D7-AF58-50D6B4E72A82}" type="datetimeFigureOut">
               <a:rPr lang="en-IN" smtClean="0"/>
-              <a:t>11-11-2025</a:t>
+              <a:t>12-11-2025</a:t>
             </a:fld>
             <a:endParaRPr lang="en-IN"/>
           </a:p>
@@ -673,7 +673,7 @@
           <a:p>
             <a:fld id="{4B75F328-0CFE-44D7-AF58-50D6B4E72A82}" type="datetimeFigureOut">
               <a:rPr lang="en-IN" smtClean="0"/>
-              <a:t>11-11-2025</a:t>
+              <a:t>12-11-2025</a:t>
             </a:fld>
             <a:endParaRPr lang="en-IN"/>
           </a:p>
@@ -873,7 +873,7 @@
           <a:p>
             <a:fld id="{4B75F328-0CFE-44D7-AF58-50D6B4E72A82}" type="datetimeFigureOut">
               <a:rPr lang="en-IN" smtClean="0"/>
-              <a:t>11-11-2025</a:t>
+              <a:t>12-11-2025</a:t>
             </a:fld>
             <a:endParaRPr lang="en-IN"/>
           </a:p>
@@ -1149,7 +1149,7 @@
           <a:p>
             <a:fld id="{4B75F328-0CFE-44D7-AF58-50D6B4E72A82}" type="datetimeFigureOut">
               <a:rPr lang="en-IN" smtClean="0"/>
-              <a:t>11-11-2025</a:t>
+              <a:t>12-11-2025</a:t>
             </a:fld>
             <a:endParaRPr lang="en-IN"/>
           </a:p>
@@ -1417,7 +1417,7 @@
           <a:p>
             <a:fld id="{4B75F328-0CFE-44D7-AF58-50D6B4E72A82}" type="datetimeFigureOut">
               <a:rPr lang="en-IN" smtClean="0"/>
-              <a:t>11-11-2025</a:t>
+              <a:t>12-11-2025</a:t>
             </a:fld>
             <a:endParaRPr lang="en-IN"/>
           </a:p>
@@ -1832,7 +1832,7 @@
           <a:p>
             <a:fld id="{4B75F328-0CFE-44D7-AF58-50D6B4E72A82}" type="datetimeFigureOut">
               <a:rPr lang="en-IN" smtClean="0"/>
-              <a:t>11-11-2025</a:t>
+              <a:t>12-11-2025</a:t>
             </a:fld>
             <a:endParaRPr lang="en-IN"/>
           </a:p>
@@ -1974,7 +1974,7 @@
           <a:p>
             <a:fld id="{4B75F328-0CFE-44D7-AF58-50D6B4E72A82}" type="datetimeFigureOut">
               <a:rPr lang="en-IN" smtClean="0"/>
-              <a:t>11-11-2025</a:t>
+              <a:t>12-11-2025</a:t>
             </a:fld>
             <a:endParaRPr lang="en-IN"/>
           </a:p>
@@ -2087,7 +2087,7 @@
           <a:p>
             <a:fld id="{4B75F328-0CFE-44D7-AF58-50D6B4E72A82}" type="datetimeFigureOut">
               <a:rPr lang="en-IN" smtClean="0"/>
-              <a:t>11-11-2025</a:t>
+              <a:t>12-11-2025</a:t>
             </a:fld>
             <a:endParaRPr lang="en-IN"/>
           </a:p>
@@ -2400,7 +2400,7 @@
           <a:p>
             <a:fld id="{4B75F328-0CFE-44D7-AF58-50D6B4E72A82}" type="datetimeFigureOut">
               <a:rPr lang="en-IN" smtClean="0"/>
-              <a:t>11-11-2025</a:t>
+              <a:t>12-11-2025</a:t>
             </a:fld>
             <a:endParaRPr lang="en-IN"/>
           </a:p>
@@ -2689,7 +2689,7 @@
           <a:p>
             <a:fld id="{4B75F328-0CFE-44D7-AF58-50D6B4E72A82}" type="datetimeFigureOut">
               <a:rPr lang="en-IN" smtClean="0"/>
-              <a:t>11-11-2025</a:t>
+              <a:t>12-11-2025</a:t>
             </a:fld>
             <a:endParaRPr lang="en-IN"/>
           </a:p>
@@ -2932,7 +2932,7 @@
           <a:p>
             <a:fld id="{4B75F328-0CFE-44D7-AF58-50D6B4E72A82}" type="datetimeFigureOut">
               <a:rPr lang="en-IN" smtClean="0"/>
-              <a:t>11-11-2025</a:t>
+              <a:t>12-11-2025</a:t>
             </a:fld>
             <a:endParaRPr lang="en-IN"/>
           </a:p>
@@ -3969,7 +3969,7 @@
             <p:ph idx="1"/>
             <p:extLst>
               <p:ext uri="{D42A27DB-BD31-4B8C-83A1-F6EECF244321}">
-                <p14:modId xmlns:p14="http://schemas.microsoft.com/office/powerpoint/2010/main" val="2807782918"/>
+                <p14:modId xmlns:p14="http://schemas.microsoft.com/office/powerpoint/2010/main" val="3704144667"/>
               </p:ext>
             </p:extLst>
           </p:nvPr>
@@ -4825,12 +4825,12 @@
                     <a:p>
                       <a:pPr algn="ctr" fontAlgn="ctr"/>
                       <a:r>
-                        <a:rPr lang="en-IN" sz="800" u="none" strike="noStrike" dirty="0">
-                          <a:effectLst/>
-                        </a:rPr>
-                        <a:t> </a:t>
-                      </a:r>
-                      <a:endParaRPr lang="en-IN" sz="800" b="0" i="0" u="none" strike="noStrike" dirty="0">
+                        <a:rPr lang="en-IN" sz="1400" u="none" strike="noStrike" dirty="0">
+                          <a:effectLst/>
+                        </a:rPr>
+                        <a:t>DONE </a:t>
+                      </a:r>
+                      <a:endParaRPr lang="en-IN" sz="1400" b="0" i="0" u="none" strike="noStrike" dirty="0">
                         <a:solidFill>
                           <a:srgbClr val="000000"/>
                         </a:solidFill>

</xml_diff>